<commit_message>
Actualizadas historias de usuario
</commit_message>
<xml_diff>
--- a/misc/historias_usuario/GRUPO 2/2-5-Listar Historias de Usuario en backlog.pptx
+++ b/misc/historias_usuario/GRUPO 2/2-5-Listar Historias de Usuario en backlog.pptx
@@ -8,8 +8,6 @@
     <p:sldId id="257" r:id="rId2"/>
     <p:sldId id="261" r:id="rId3"/>
     <p:sldId id="260" r:id="rId4"/>
-    <p:sldId id="258" r:id="rId5"/>
-    <p:sldId id="259" r:id="rId6"/>
   </p:sldIdLst>
   <p:sldSz cx="9144000" cy="6858000" type="screen4x3"/>
   <p:notesSz cx="6858000" cy="9144000"/>
@@ -3420,8 +3418,8 @@
         </p:nvSpPr>
         <p:spPr>
           <a:xfrm>
-            <a:off x="729927" y="1124744"/>
-            <a:ext cx="7776864" cy="1296144"/>
+            <a:off x="768477" y="1139877"/>
+            <a:ext cx="7776864" cy="4104456"/>
           </a:xfrm>
           <a:prstGeom prst="rect">
             <a:avLst/>
@@ -3455,7 +3453,11 @@
             <a:pPr algn="ctr"/>
             <a:r>
               <a:rPr lang="es-ES" dirty="0" smtClean="0"/>
-              <a:t>TABLA CON LAS HISTORIAS DE USUARIO SIN ASIGNAR ACTIVIDADES</a:t>
+              <a:t>TABLA CON LAS HISTORIAS DE </a:t>
+            </a:r>
+            <a:r>
+              <a:rPr lang="es-ES" dirty="0" smtClean="0"/>
+              <a:t>USUARIO</a:t>
             </a:r>
             <a:endParaRPr lang="es-ES" dirty="0"/>
           </a:p>
@@ -3497,7 +3499,7 @@
             <a:pPr algn="ctr"/>
             <a:r>
               <a:rPr lang="es-ES" dirty="0" smtClean="0"/>
-              <a:t>POR PRIORIDAD</a:t>
+              <a:t>EMPEZADAS</a:t>
             </a:r>
             <a:endParaRPr lang="es-ES" dirty="0"/>
           </a:p>
@@ -3539,7 +3541,7 @@
             <a:pPr algn="ctr"/>
             <a:r>
               <a:rPr lang="es-ES" dirty="0" smtClean="0"/>
-              <a:t>POR ESFUERZO</a:t>
+              <a:t>FINALIZADAS</a:t>
             </a:r>
             <a:endParaRPr lang="es-ES" dirty="0"/>
           </a:p>
@@ -3774,8 +3776,8 @@
         </p:nvSpPr>
         <p:spPr>
           <a:xfrm>
-            <a:off x="3541064" y="748331"/>
-            <a:ext cx="1431100" cy="360040"/>
+            <a:off x="3322215" y="748331"/>
+            <a:ext cx="1649949" cy="360040"/>
           </a:xfrm>
           <a:prstGeom prst="rect">
             <a:avLst/>
@@ -3801,8 +3803,8 @@
           <a:p>
             <a:pPr algn="ctr"/>
             <a:r>
-              <a:rPr lang="es-ES" dirty="0" smtClean="0"/>
-              <a:t>POR VALOR</a:t>
+              <a:rPr lang="es-ES" smtClean="0"/>
+              <a:t>INICIAL</a:t>
             </a:r>
             <a:endParaRPr lang="es-ES" dirty="0"/>
           </a:p>
@@ -3868,914 +3870,6 @@
       </p:sp>
       <p:sp>
         <p:nvSpPr>
-          <p:cNvPr id="28" name="27 Rectángulo"/>
-          <p:cNvSpPr/>
-          <p:nvPr/>
-        </p:nvSpPr>
-        <p:spPr>
-          <a:xfrm>
-            <a:off x="792956" y="3072128"/>
-            <a:ext cx="7776864" cy="1090336"/>
-          </a:xfrm>
-          <a:prstGeom prst="rect">
-            <a:avLst/>
-          </a:prstGeom>
-          <a:ln>
-            <a:solidFill>
-              <a:srgbClr val="C00000"/>
-            </a:solidFill>
-          </a:ln>
-        </p:spPr>
-        <p:style>
-          <a:lnRef idx="2">
-            <a:schemeClr val="accent1">
-              <a:shade val="50000"/>
-            </a:schemeClr>
-          </a:lnRef>
-          <a:fillRef idx="1">
-            <a:schemeClr val="accent1"/>
-          </a:fillRef>
-          <a:effectRef idx="0">
-            <a:schemeClr val="accent1"/>
-          </a:effectRef>
-          <a:fontRef idx="minor">
-            <a:schemeClr val="lt1"/>
-          </a:fontRef>
-        </p:style>
-        <p:txBody>
-          <a:bodyPr rtlCol="0" anchor="ctr"/>
-          <a:lstStyle/>
-          <a:p>
-            <a:pPr algn="ctr"/>
-            <a:r>
-              <a:rPr lang="es-ES" dirty="0" smtClean="0"/>
-              <a:t>TABLA CON LAS HISTORIAS DE USUARIO EMPEZADAS</a:t>
-            </a:r>
-            <a:endParaRPr lang="es-ES" dirty="0"/>
-          </a:p>
-        </p:txBody>
-      </p:sp>
-      <p:sp>
-        <p:nvSpPr>
-          <p:cNvPr id="29" name="28 Rectángulo"/>
-          <p:cNvSpPr/>
-          <p:nvPr/>
-        </p:nvSpPr>
-        <p:spPr>
-          <a:xfrm>
-            <a:off x="5041428" y="2694576"/>
-            <a:ext cx="1800200" cy="360040"/>
-          </a:xfrm>
-          <a:prstGeom prst="rect">
-            <a:avLst/>
-          </a:prstGeom>
-        </p:spPr>
-        <p:style>
-          <a:lnRef idx="2">
-            <a:schemeClr val="accent6"/>
-          </a:lnRef>
-          <a:fillRef idx="1">
-            <a:schemeClr val="lt1"/>
-          </a:fillRef>
-          <a:effectRef idx="0">
-            <a:schemeClr val="accent6"/>
-          </a:effectRef>
-          <a:fontRef idx="minor">
-            <a:schemeClr val="dk1"/>
-          </a:fontRef>
-        </p:style>
-        <p:txBody>
-          <a:bodyPr rtlCol="0" anchor="ctr"/>
-          <a:lstStyle/>
-          <a:p>
-            <a:pPr algn="ctr"/>
-            <a:r>
-              <a:rPr lang="es-ES" dirty="0" smtClean="0"/>
-              <a:t>POR PRIORIDAD</a:t>
-            </a:r>
-            <a:endParaRPr lang="es-ES" dirty="0"/>
-          </a:p>
-        </p:txBody>
-      </p:sp>
-      <p:sp>
-        <p:nvSpPr>
-          <p:cNvPr id="30" name="29 Rectángulo"/>
-          <p:cNvSpPr/>
-          <p:nvPr/>
-        </p:nvSpPr>
-        <p:spPr>
-          <a:xfrm>
-            <a:off x="6841628" y="2694576"/>
-            <a:ext cx="1728192" cy="360040"/>
-          </a:xfrm>
-          <a:prstGeom prst="rect">
-            <a:avLst/>
-          </a:prstGeom>
-        </p:spPr>
-        <p:style>
-          <a:lnRef idx="2">
-            <a:schemeClr val="accent6"/>
-          </a:lnRef>
-          <a:fillRef idx="1">
-            <a:schemeClr val="lt1"/>
-          </a:fillRef>
-          <a:effectRef idx="0">
-            <a:schemeClr val="accent6"/>
-          </a:effectRef>
-          <a:fontRef idx="minor">
-            <a:schemeClr val="dk1"/>
-          </a:fontRef>
-        </p:style>
-        <p:txBody>
-          <a:bodyPr rtlCol="0" anchor="ctr"/>
-          <a:lstStyle/>
-          <a:p>
-            <a:pPr algn="ctr"/>
-            <a:r>
-              <a:rPr lang="es-ES" dirty="0" smtClean="0"/>
-              <a:t>POR ESFUERZO</a:t>
-            </a:r>
-            <a:endParaRPr lang="es-ES" dirty="0"/>
-          </a:p>
-        </p:txBody>
-      </p:sp>
-      <p:sp>
-        <p:nvSpPr>
-          <p:cNvPr id="31" name="30 Rectángulo"/>
-          <p:cNvSpPr/>
-          <p:nvPr/>
-        </p:nvSpPr>
-        <p:spPr>
-          <a:xfrm>
-            <a:off x="807028" y="3046340"/>
-            <a:ext cx="2592289" cy="288032"/>
-          </a:xfrm>
-          <a:prstGeom prst="rect">
-            <a:avLst/>
-          </a:prstGeom>
-          <a:solidFill>
-            <a:schemeClr val="accent3">
-              <a:lumMod val="60000"/>
-              <a:lumOff val="40000"/>
-            </a:schemeClr>
-          </a:solidFill>
-        </p:spPr>
-        <p:style>
-          <a:lnRef idx="2">
-            <a:schemeClr val="accent1">
-              <a:shade val="50000"/>
-            </a:schemeClr>
-          </a:lnRef>
-          <a:fillRef idx="1">
-            <a:schemeClr val="accent1"/>
-          </a:fillRef>
-          <a:effectRef idx="0">
-            <a:schemeClr val="accent1"/>
-          </a:effectRef>
-          <a:fontRef idx="minor">
-            <a:schemeClr val="lt1"/>
-          </a:fontRef>
-        </p:style>
-        <p:txBody>
-          <a:bodyPr rtlCol="0" anchor="ctr"/>
-          <a:lstStyle/>
-          <a:p>
-            <a:pPr algn="ctr"/>
-            <a:r>
-              <a:rPr lang="es-ES" dirty="0" smtClean="0">
-                <a:solidFill>
-                  <a:schemeClr val="tx1"/>
-                </a:solidFill>
-              </a:rPr>
-              <a:t>TITULO</a:t>
-            </a:r>
-            <a:endParaRPr lang="es-ES" dirty="0">
-              <a:solidFill>
-                <a:schemeClr val="tx1"/>
-              </a:solidFill>
-            </a:endParaRPr>
-          </a:p>
-        </p:txBody>
-      </p:sp>
-      <p:sp>
-        <p:nvSpPr>
-          <p:cNvPr id="32" name="31 Rectángulo"/>
-          <p:cNvSpPr/>
-          <p:nvPr/>
-        </p:nvSpPr>
-        <p:spPr>
-          <a:xfrm>
-            <a:off x="4500162" y="3046448"/>
-            <a:ext cx="1347704" cy="288032"/>
-          </a:xfrm>
-          <a:prstGeom prst="rect">
-            <a:avLst/>
-          </a:prstGeom>
-          <a:solidFill>
-            <a:schemeClr val="accent3">
-              <a:lumMod val="60000"/>
-              <a:lumOff val="40000"/>
-            </a:schemeClr>
-          </a:solidFill>
-        </p:spPr>
-        <p:style>
-          <a:lnRef idx="2">
-            <a:schemeClr val="accent1">
-              <a:shade val="50000"/>
-            </a:schemeClr>
-          </a:lnRef>
-          <a:fillRef idx="1">
-            <a:schemeClr val="accent1"/>
-          </a:fillRef>
-          <a:effectRef idx="0">
-            <a:schemeClr val="accent1"/>
-          </a:effectRef>
-          <a:fontRef idx="minor">
-            <a:schemeClr val="lt1"/>
-          </a:fontRef>
-        </p:style>
-        <p:txBody>
-          <a:bodyPr rtlCol="0" anchor="ctr"/>
-          <a:lstStyle/>
-          <a:p>
-            <a:pPr algn="ctr"/>
-            <a:r>
-              <a:rPr lang="es-ES" dirty="0" smtClean="0">
-                <a:solidFill>
-                  <a:schemeClr val="tx1"/>
-                </a:solidFill>
-              </a:rPr>
-              <a:t>PRIORIDAD</a:t>
-            </a:r>
-            <a:endParaRPr lang="es-ES" dirty="0">
-              <a:solidFill>
-                <a:schemeClr val="tx1"/>
-              </a:solidFill>
-            </a:endParaRPr>
-          </a:p>
-        </p:txBody>
-      </p:sp>
-      <p:sp>
-        <p:nvSpPr>
-          <p:cNvPr id="33" name="32 Rectángulo"/>
-          <p:cNvSpPr/>
-          <p:nvPr/>
-        </p:nvSpPr>
-        <p:spPr>
-          <a:xfrm>
-            <a:off x="5833515" y="3046448"/>
-            <a:ext cx="1197953" cy="288032"/>
-          </a:xfrm>
-          <a:prstGeom prst="rect">
-            <a:avLst/>
-          </a:prstGeom>
-          <a:solidFill>
-            <a:schemeClr val="accent3">
-              <a:lumMod val="60000"/>
-              <a:lumOff val="40000"/>
-            </a:schemeClr>
-          </a:solidFill>
-        </p:spPr>
-        <p:style>
-          <a:lnRef idx="2">
-            <a:schemeClr val="accent1">
-              <a:shade val="50000"/>
-            </a:schemeClr>
-          </a:lnRef>
-          <a:fillRef idx="1">
-            <a:schemeClr val="accent1"/>
-          </a:fillRef>
-          <a:effectRef idx="0">
-            <a:schemeClr val="accent1"/>
-          </a:effectRef>
-          <a:fontRef idx="minor">
-            <a:schemeClr val="lt1"/>
-          </a:fontRef>
-        </p:style>
-        <p:txBody>
-          <a:bodyPr rtlCol="0" anchor="ctr"/>
-          <a:lstStyle/>
-          <a:p>
-            <a:pPr algn="ctr"/>
-            <a:r>
-              <a:rPr lang="es-ES" dirty="0" smtClean="0">
-                <a:solidFill>
-                  <a:schemeClr val="tx1"/>
-                </a:solidFill>
-              </a:rPr>
-              <a:t>ESFUERZO</a:t>
-            </a:r>
-            <a:endParaRPr lang="es-ES" dirty="0">
-              <a:solidFill>
-                <a:schemeClr val="tx1"/>
-              </a:solidFill>
-            </a:endParaRPr>
-          </a:p>
-        </p:txBody>
-      </p:sp>
-      <p:sp>
-        <p:nvSpPr>
-          <p:cNvPr id="34" name="33 Rectángulo"/>
-          <p:cNvSpPr/>
-          <p:nvPr/>
-        </p:nvSpPr>
-        <p:spPr>
-          <a:xfrm>
-            <a:off x="7057650" y="3046448"/>
-            <a:ext cx="1512169" cy="288032"/>
-          </a:xfrm>
-          <a:prstGeom prst="rect">
-            <a:avLst/>
-          </a:prstGeom>
-          <a:solidFill>
-            <a:srgbClr val="FF0000"/>
-          </a:solidFill>
-        </p:spPr>
-        <p:style>
-          <a:lnRef idx="2">
-            <a:schemeClr val="accent1">
-              <a:shade val="50000"/>
-            </a:schemeClr>
-          </a:lnRef>
-          <a:fillRef idx="1">
-            <a:schemeClr val="accent1"/>
-          </a:fillRef>
-          <a:effectRef idx="0">
-            <a:schemeClr val="accent1"/>
-          </a:effectRef>
-          <a:fontRef idx="minor">
-            <a:schemeClr val="lt1"/>
-          </a:fontRef>
-        </p:style>
-        <p:txBody>
-          <a:bodyPr rtlCol="0" anchor="ctr"/>
-          <a:lstStyle/>
-          <a:p>
-            <a:pPr algn="ctr"/>
-            <a:r>
-              <a:rPr lang="es-ES" sz="1000" b="1" dirty="0" smtClean="0"/>
-              <a:t>BOTON  DE CONSULTAR</a:t>
-            </a:r>
-            <a:endParaRPr lang="es-ES" sz="1000" b="1" dirty="0"/>
-          </a:p>
-        </p:txBody>
-      </p:sp>
-      <p:sp>
-        <p:nvSpPr>
-          <p:cNvPr id="35" name="34 Rectángulo"/>
-          <p:cNvSpPr/>
-          <p:nvPr/>
-        </p:nvSpPr>
-        <p:spPr>
-          <a:xfrm>
-            <a:off x="3604093" y="2695715"/>
-            <a:ext cx="1431100" cy="360040"/>
-          </a:xfrm>
-          <a:prstGeom prst="rect">
-            <a:avLst/>
-          </a:prstGeom>
-        </p:spPr>
-        <p:style>
-          <a:lnRef idx="2">
-            <a:schemeClr val="accent6"/>
-          </a:lnRef>
-          <a:fillRef idx="1">
-            <a:schemeClr val="lt1"/>
-          </a:fillRef>
-          <a:effectRef idx="0">
-            <a:schemeClr val="accent6"/>
-          </a:effectRef>
-          <a:fontRef idx="minor">
-            <a:schemeClr val="dk1"/>
-          </a:fontRef>
-        </p:style>
-        <p:txBody>
-          <a:bodyPr rtlCol="0" anchor="ctr"/>
-          <a:lstStyle/>
-          <a:p>
-            <a:pPr algn="ctr"/>
-            <a:r>
-              <a:rPr lang="es-ES" dirty="0" smtClean="0"/>
-              <a:t>POR VALOR</a:t>
-            </a:r>
-            <a:endParaRPr lang="es-ES" dirty="0"/>
-          </a:p>
-        </p:txBody>
-      </p:sp>
-      <p:sp>
-        <p:nvSpPr>
-          <p:cNvPr id="36" name="35 Rectángulo"/>
-          <p:cNvSpPr/>
-          <p:nvPr/>
-        </p:nvSpPr>
-        <p:spPr>
-          <a:xfrm>
-            <a:off x="3385244" y="3046448"/>
-            <a:ext cx="1114918" cy="288032"/>
-          </a:xfrm>
-          <a:prstGeom prst="rect">
-            <a:avLst/>
-          </a:prstGeom>
-          <a:solidFill>
-            <a:schemeClr val="accent3">
-              <a:lumMod val="60000"/>
-              <a:lumOff val="40000"/>
-            </a:schemeClr>
-          </a:solidFill>
-        </p:spPr>
-        <p:style>
-          <a:lnRef idx="2">
-            <a:schemeClr val="accent1">
-              <a:shade val="50000"/>
-            </a:schemeClr>
-          </a:lnRef>
-          <a:fillRef idx="1">
-            <a:schemeClr val="accent1"/>
-          </a:fillRef>
-          <a:effectRef idx="0">
-            <a:schemeClr val="accent1"/>
-          </a:effectRef>
-          <a:fontRef idx="minor">
-            <a:schemeClr val="lt1"/>
-          </a:fontRef>
-        </p:style>
-        <p:txBody>
-          <a:bodyPr rtlCol="0" anchor="ctr"/>
-          <a:lstStyle/>
-          <a:p>
-            <a:pPr algn="ctr"/>
-            <a:r>
-              <a:rPr lang="es-ES" dirty="0" smtClean="0">
-                <a:solidFill>
-                  <a:schemeClr val="tx1"/>
-                </a:solidFill>
-              </a:rPr>
-              <a:t>VALOR</a:t>
-            </a:r>
-            <a:endParaRPr lang="es-ES" dirty="0">
-              <a:solidFill>
-                <a:schemeClr val="tx1"/>
-              </a:solidFill>
-            </a:endParaRPr>
-          </a:p>
-        </p:txBody>
-      </p:sp>
-      <p:sp>
-        <p:nvSpPr>
-          <p:cNvPr id="46" name="45 Rectángulo"/>
-          <p:cNvSpPr/>
-          <p:nvPr/>
-        </p:nvSpPr>
-        <p:spPr>
-          <a:xfrm>
-            <a:off x="814599" y="5101557"/>
-            <a:ext cx="7776864" cy="1090336"/>
-          </a:xfrm>
-          <a:prstGeom prst="rect">
-            <a:avLst/>
-          </a:prstGeom>
-          <a:ln>
-            <a:solidFill>
-              <a:srgbClr val="C00000"/>
-            </a:solidFill>
-          </a:ln>
-        </p:spPr>
-        <p:style>
-          <a:lnRef idx="2">
-            <a:schemeClr val="accent1">
-              <a:shade val="50000"/>
-            </a:schemeClr>
-          </a:lnRef>
-          <a:fillRef idx="1">
-            <a:schemeClr val="accent1"/>
-          </a:fillRef>
-          <a:effectRef idx="0">
-            <a:schemeClr val="accent1"/>
-          </a:effectRef>
-          <a:fontRef idx="minor">
-            <a:schemeClr val="lt1"/>
-          </a:fontRef>
-        </p:style>
-        <p:txBody>
-          <a:bodyPr rtlCol="0" anchor="ctr"/>
-          <a:lstStyle/>
-          <a:p>
-            <a:pPr algn="ctr"/>
-            <a:r>
-              <a:rPr lang="es-ES" dirty="0" smtClean="0"/>
-              <a:t>TABLA CON LAS HISTORIAS DE USUARIO FINALIZADAS</a:t>
-            </a:r>
-            <a:endParaRPr lang="es-ES" dirty="0"/>
-          </a:p>
-        </p:txBody>
-      </p:sp>
-      <p:sp>
-        <p:nvSpPr>
-          <p:cNvPr id="47" name="46 Rectángulo"/>
-          <p:cNvSpPr/>
-          <p:nvPr/>
-        </p:nvSpPr>
-        <p:spPr>
-          <a:xfrm>
-            <a:off x="5063071" y="4724005"/>
-            <a:ext cx="1800200" cy="360040"/>
-          </a:xfrm>
-          <a:prstGeom prst="rect">
-            <a:avLst/>
-          </a:prstGeom>
-        </p:spPr>
-        <p:style>
-          <a:lnRef idx="2">
-            <a:schemeClr val="accent6"/>
-          </a:lnRef>
-          <a:fillRef idx="1">
-            <a:schemeClr val="lt1"/>
-          </a:fillRef>
-          <a:effectRef idx="0">
-            <a:schemeClr val="accent6"/>
-          </a:effectRef>
-          <a:fontRef idx="minor">
-            <a:schemeClr val="dk1"/>
-          </a:fontRef>
-        </p:style>
-        <p:txBody>
-          <a:bodyPr rtlCol="0" anchor="ctr"/>
-          <a:lstStyle/>
-          <a:p>
-            <a:pPr algn="ctr"/>
-            <a:r>
-              <a:rPr lang="es-ES" dirty="0" smtClean="0"/>
-              <a:t>POR PRIORIDAD</a:t>
-            </a:r>
-            <a:endParaRPr lang="es-ES" dirty="0"/>
-          </a:p>
-        </p:txBody>
-      </p:sp>
-      <p:sp>
-        <p:nvSpPr>
-          <p:cNvPr id="48" name="47 Rectángulo"/>
-          <p:cNvSpPr/>
-          <p:nvPr/>
-        </p:nvSpPr>
-        <p:spPr>
-          <a:xfrm>
-            <a:off x="6863271" y="4724005"/>
-            <a:ext cx="1728192" cy="360040"/>
-          </a:xfrm>
-          <a:prstGeom prst="rect">
-            <a:avLst/>
-          </a:prstGeom>
-        </p:spPr>
-        <p:style>
-          <a:lnRef idx="2">
-            <a:schemeClr val="accent6"/>
-          </a:lnRef>
-          <a:fillRef idx="1">
-            <a:schemeClr val="lt1"/>
-          </a:fillRef>
-          <a:effectRef idx="0">
-            <a:schemeClr val="accent6"/>
-          </a:effectRef>
-          <a:fontRef idx="minor">
-            <a:schemeClr val="dk1"/>
-          </a:fontRef>
-        </p:style>
-        <p:txBody>
-          <a:bodyPr rtlCol="0" anchor="ctr"/>
-          <a:lstStyle/>
-          <a:p>
-            <a:pPr algn="ctr"/>
-            <a:r>
-              <a:rPr lang="es-ES" dirty="0" smtClean="0"/>
-              <a:t>POR ESFUERZO</a:t>
-            </a:r>
-            <a:endParaRPr lang="es-ES" dirty="0"/>
-          </a:p>
-        </p:txBody>
-      </p:sp>
-      <p:sp>
-        <p:nvSpPr>
-          <p:cNvPr id="49" name="48 Rectángulo"/>
-          <p:cNvSpPr/>
-          <p:nvPr/>
-        </p:nvSpPr>
-        <p:spPr>
-          <a:xfrm>
-            <a:off x="828671" y="5075769"/>
-            <a:ext cx="2592289" cy="288032"/>
-          </a:xfrm>
-          <a:prstGeom prst="rect">
-            <a:avLst/>
-          </a:prstGeom>
-          <a:solidFill>
-            <a:schemeClr val="accent3">
-              <a:lumMod val="60000"/>
-              <a:lumOff val="40000"/>
-            </a:schemeClr>
-          </a:solidFill>
-        </p:spPr>
-        <p:style>
-          <a:lnRef idx="2">
-            <a:schemeClr val="accent1">
-              <a:shade val="50000"/>
-            </a:schemeClr>
-          </a:lnRef>
-          <a:fillRef idx="1">
-            <a:schemeClr val="accent1"/>
-          </a:fillRef>
-          <a:effectRef idx="0">
-            <a:schemeClr val="accent1"/>
-          </a:effectRef>
-          <a:fontRef idx="minor">
-            <a:schemeClr val="lt1"/>
-          </a:fontRef>
-        </p:style>
-        <p:txBody>
-          <a:bodyPr rtlCol="0" anchor="ctr"/>
-          <a:lstStyle/>
-          <a:p>
-            <a:pPr algn="ctr"/>
-            <a:r>
-              <a:rPr lang="es-ES" dirty="0" smtClean="0">
-                <a:solidFill>
-                  <a:schemeClr val="tx1"/>
-                </a:solidFill>
-              </a:rPr>
-              <a:t>TITULO</a:t>
-            </a:r>
-            <a:endParaRPr lang="es-ES" dirty="0">
-              <a:solidFill>
-                <a:schemeClr val="tx1"/>
-              </a:solidFill>
-            </a:endParaRPr>
-          </a:p>
-        </p:txBody>
-      </p:sp>
-      <p:sp>
-        <p:nvSpPr>
-          <p:cNvPr id="50" name="49 Rectángulo"/>
-          <p:cNvSpPr/>
-          <p:nvPr/>
-        </p:nvSpPr>
-        <p:spPr>
-          <a:xfrm>
-            <a:off x="4521805" y="5075877"/>
-            <a:ext cx="1347704" cy="288032"/>
-          </a:xfrm>
-          <a:prstGeom prst="rect">
-            <a:avLst/>
-          </a:prstGeom>
-          <a:solidFill>
-            <a:schemeClr val="accent3">
-              <a:lumMod val="60000"/>
-              <a:lumOff val="40000"/>
-            </a:schemeClr>
-          </a:solidFill>
-        </p:spPr>
-        <p:style>
-          <a:lnRef idx="2">
-            <a:schemeClr val="accent1">
-              <a:shade val="50000"/>
-            </a:schemeClr>
-          </a:lnRef>
-          <a:fillRef idx="1">
-            <a:schemeClr val="accent1"/>
-          </a:fillRef>
-          <a:effectRef idx="0">
-            <a:schemeClr val="accent1"/>
-          </a:effectRef>
-          <a:fontRef idx="minor">
-            <a:schemeClr val="lt1"/>
-          </a:fontRef>
-        </p:style>
-        <p:txBody>
-          <a:bodyPr rtlCol="0" anchor="ctr"/>
-          <a:lstStyle/>
-          <a:p>
-            <a:pPr algn="ctr"/>
-            <a:r>
-              <a:rPr lang="es-ES" dirty="0" smtClean="0">
-                <a:solidFill>
-                  <a:schemeClr val="tx1"/>
-                </a:solidFill>
-              </a:rPr>
-              <a:t>PRIORIDAD</a:t>
-            </a:r>
-            <a:endParaRPr lang="es-ES" dirty="0">
-              <a:solidFill>
-                <a:schemeClr val="tx1"/>
-              </a:solidFill>
-            </a:endParaRPr>
-          </a:p>
-        </p:txBody>
-      </p:sp>
-      <p:sp>
-        <p:nvSpPr>
-          <p:cNvPr id="51" name="50 Rectángulo"/>
-          <p:cNvSpPr/>
-          <p:nvPr/>
-        </p:nvSpPr>
-        <p:spPr>
-          <a:xfrm>
-            <a:off x="5855158" y="5075877"/>
-            <a:ext cx="1197953" cy="288032"/>
-          </a:xfrm>
-          <a:prstGeom prst="rect">
-            <a:avLst/>
-          </a:prstGeom>
-          <a:solidFill>
-            <a:schemeClr val="accent3">
-              <a:lumMod val="60000"/>
-              <a:lumOff val="40000"/>
-            </a:schemeClr>
-          </a:solidFill>
-        </p:spPr>
-        <p:style>
-          <a:lnRef idx="2">
-            <a:schemeClr val="accent1">
-              <a:shade val="50000"/>
-            </a:schemeClr>
-          </a:lnRef>
-          <a:fillRef idx="1">
-            <a:schemeClr val="accent1"/>
-          </a:fillRef>
-          <a:effectRef idx="0">
-            <a:schemeClr val="accent1"/>
-          </a:effectRef>
-          <a:fontRef idx="minor">
-            <a:schemeClr val="lt1"/>
-          </a:fontRef>
-        </p:style>
-        <p:txBody>
-          <a:bodyPr rtlCol="0" anchor="ctr"/>
-          <a:lstStyle/>
-          <a:p>
-            <a:pPr algn="ctr"/>
-            <a:r>
-              <a:rPr lang="es-ES" dirty="0" smtClean="0">
-                <a:solidFill>
-                  <a:schemeClr val="tx1"/>
-                </a:solidFill>
-              </a:rPr>
-              <a:t>ESFUERZO</a:t>
-            </a:r>
-            <a:endParaRPr lang="es-ES" dirty="0">
-              <a:solidFill>
-                <a:schemeClr val="tx1"/>
-              </a:solidFill>
-            </a:endParaRPr>
-          </a:p>
-        </p:txBody>
-      </p:sp>
-      <p:sp>
-        <p:nvSpPr>
-          <p:cNvPr id="52" name="51 Rectángulo"/>
-          <p:cNvSpPr/>
-          <p:nvPr/>
-        </p:nvSpPr>
-        <p:spPr>
-          <a:xfrm>
-            <a:off x="7079293" y="5075877"/>
-            <a:ext cx="1512169" cy="288032"/>
-          </a:xfrm>
-          <a:prstGeom prst="rect">
-            <a:avLst/>
-          </a:prstGeom>
-          <a:solidFill>
-            <a:srgbClr val="FF0000"/>
-          </a:solidFill>
-        </p:spPr>
-        <p:style>
-          <a:lnRef idx="2">
-            <a:schemeClr val="accent1">
-              <a:shade val="50000"/>
-            </a:schemeClr>
-          </a:lnRef>
-          <a:fillRef idx="1">
-            <a:schemeClr val="accent1"/>
-          </a:fillRef>
-          <a:effectRef idx="0">
-            <a:schemeClr val="accent1"/>
-          </a:effectRef>
-          <a:fontRef idx="minor">
-            <a:schemeClr val="lt1"/>
-          </a:fontRef>
-        </p:style>
-        <p:txBody>
-          <a:bodyPr rtlCol="0" anchor="ctr"/>
-          <a:lstStyle/>
-          <a:p>
-            <a:pPr algn="ctr"/>
-            <a:r>
-              <a:rPr lang="es-ES" sz="1000" b="1" dirty="0" smtClean="0"/>
-              <a:t>BOTON  DE CONSULTAR</a:t>
-            </a:r>
-            <a:endParaRPr lang="es-ES" sz="1000" b="1" dirty="0"/>
-          </a:p>
-        </p:txBody>
-      </p:sp>
-      <p:sp>
-        <p:nvSpPr>
-          <p:cNvPr id="53" name="52 Rectángulo"/>
-          <p:cNvSpPr/>
-          <p:nvPr/>
-        </p:nvSpPr>
-        <p:spPr>
-          <a:xfrm>
-            <a:off x="3625736" y="4725144"/>
-            <a:ext cx="1431100" cy="360040"/>
-          </a:xfrm>
-          <a:prstGeom prst="rect">
-            <a:avLst/>
-          </a:prstGeom>
-        </p:spPr>
-        <p:style>
-          <a:lnRef idx="2">
-            <a:schemeClr val="accent6"/>
-          </a:lnRef>
-          <a:fillRef idx="1">
-            <a:schemeClr val="lt1"/>
-          </a:fillRef>
-          <a:effectRef idx="0">
-            <a:schemeClr val="accent6"/>
-          </a:effectRef>
-          <a:fontRef idx="minor">
-            <a:schemeClr val="dk1"/>
-          </a:fontRef>
-        </p:style>
-        <p:txBody>
-          <a:bodyPr rtlCol="0" anchor="ctr"/>
-          <a:lstStyle/>
-          <a:p>
-            <a:pPr algn="ctr"/>
-            <a:r>
-              <a:rPr lang="es-ES" dirty="0" smtClean="0"/>
-              <a:t>POR VALOR</a:t>
-            </a:r>
-            <a:endParaRPr lang="es-ES" dirty="0"/>
-          </a:p>
-        </p:txBody>
-      </p:sp>
-      <p:sp>
-        <p:nvSpPr>
-          <p:cNvPr id="54" name="53 Rectángulo"/>
-          <p:cNvSpPr/>
-          <p:nvPr/>
-        </p:nvSpPr>
-        <p:spPr>
-          <a:xfrm>
-            <a:off x="3406887" y="5075877"/>
-            <a:ext cx="1114918" cy="288032"/>
-          </a:xfrm>
-          <a:prstGeom prst="rect">
-            <a:avLst/>
-          </a:prstGeom>
-          <a:solidFill>
-            <a:schemeClr val="accent3">
-              <a:lumMod val="60000"/>
-              <a:lumOff val="40000"/>
-            </a:schemeClr>
-          </a:solidFill>
-        </p:spPr>
-        <p:style>
-          <a:lnRef idx="2">
-            <a:schemeClr val="accent1">
-              <a:shade val="50000"/>
-            </a:schemeClr>
-          </a:lnRef>
-          <a:fillRef idx="1">
-            <a:schemeClr val="accent1"/>
-          </a:fillRef>
-          <a:effectRef idx="0">
-            <a:schemeClr val="accent1"/>
-          </a:effectRef>
-          <a:fontRef idx="minor">
-            <a:schemeClr val="lt1"/>
-          </a:fontRef>
-        </p:style>
-        <p:txBody>
-          <a:bodyPr rtlCol="0" anchor="ctr"/>
-          <a:lstStyle/>
-          <a:p>
-            <a:pPr algn="ctr"/>
-            <a:r>
-              <a:rPr lang="es-ES" dirty="0" smtClean="0">
-                <a:solidFill>
-                  <a:schemeClr val="tx1"/>
-                </a:solidFill>
-              </a:rPr>
-              <a:t>VALOR</a:t>
-            </a:r>
-            <a:endParaRPr lang="es-ES" dirty="0">
-              <a:solidFill>
-                <a:schemeClr val="tx1"/>
-              </a:solidFill>
-            </a:endParaRPr>
-          </a:p>
-        </p:txBody>
-      </p:sp>
-      <p:sp>
-        <p:nvSpPr>
           <p:cNvPr id="2" name="1 CuadroTexto"/>
           <p:cNvSpPr txBox="1"/>
           <p:nvPr/>
@@ -4824,1494 +3918,6 @@
     <p:extLst>
       <p:ext uri="{BB962C8B-B14F-4D97-AF65-F5344CB8AC3E}">
         <p14:creationId xmlns:p14="http://schemas.microsoft.com/office/powerpoint/2010/main" val="900906232"/>
-      </p:ext>
-    </p:extLst>
-  </p:cSld>
-  <p:clrMapOvr>
-    <a:masterClrMapping/>
-  </p:clrMapOvr>
-  <p:timing>
-    <p:tnLst>
-      <p:par>
-        <p:cTn id="1" dur="indefinite" restart="never" nodeType="tmRoot"/>
-      </p:par>
-    </p:tnLst>
-  </p:timing>
-</p:sld>
-</file>
-
-<file path=ppt/slides/slide4.xml><?xml version="1.0" encoding="utf-8"?>
-<p:sld xmlns:a="http://schemas.openxmlformats.org/drawingml/2006/main" xmlns:r="http://schemas.openxmlformats.org/officeDocument/2006/relationships" xmlns:p="http://schemas.openxmlformats.org/presentationml/2006/main">
-  <p:cSld>
-    <p:spTree>
-      <p:nvGrpSpPr>
-        <p:cNvPr id="1" name=""/>
-        <p:cNvGrpSpPr/>
-        <p:nvPr/>
-      </p:nvGrpSpPr>
-      <p:grpSpPr>
-        <a:xfrm>
-          <a:off x="0" y="0"/>
-          <a:ext cx="0" cy="0"/>
-          <a:chOff x="0" y="0"/>
-          <a:chExt cx="0" cy="0"/>
-        </a:xfrm>
-      </p:grpSpPr>
-      <p:sp>
-        <p:nvSpPr>
-          <p:cNvPr id="4" name="3 Rectángulo"/>
-          <p:cNvSpPr/>
-          <p:nvPr/>
-        </p:nvSpPr>
-        <p:spPr>
-          <a:xfrm>
-            <a:off x="769648" y="496291"/>
-            <a:ext cx="7776864" cy="1368152"/>
-          </a:xfrm>
-          <a:prstGeom prst="rect">
-            <a:avLst/>
-          </a:prstGeom>
-        </p:spPr>
-        <p:style>
-          <a:lnRef idx="2">
-            <a:schemeClr val="accent1">
-              <a:shade val="50000"/>
-            </a:schemeClr>
-          </a:lnRef>
-          <a:fillRef idx="1">
-            <a:schemeClr val="accent1"/>
-          </a:fillRef>
-          <a:effectRef idx="0">
-            <a:schemeClr val="accent1"/>
-          </a:effectRef>
-          <a:fontRef idx="minor">
-            <a:schemeClr val="lt1"/>
-          </a:fontRef>
-        </p:style>
-        <p:txBody>
-          <a:bodyPr rtlCol="0" anchor="ctr"/>
-          <a:lstStyle/>
-          <a:p>
-            <a:pPr algn="ctr"/>
-            <a:r>
-              <a:rPr lang="es-ES" dirty="0" smtClean="0"/>
-              <a:t>HISTORIAS SIN DEFINIR SU PRIORIDAD Y ESFUERZO</a:t>
-            </a:r>
-            <a:endParaRPr lang="es-ES" dirty="0"/>
-          </a:p>
-        </p:txBody>
-      </p:sp>
-      <p:sp>
-        <p:nvSpPr>
-          <p:cNvPr id="5" name="4 Rectángulo"/>
-          <p:cNvSpPr/>
-          <p:nvPr/>
-        </p:nvSpPr>
-        <p:spPr>
-          <a:xfrm>
-            <a:off x="755576" y="2420888"/>
-            <a:ext cx="7776864" cy="3672408"/>
-          </a:xfrm>
-          <a:prstGeom prst="rect">
-            <a:avLst/>
-          </a:prstGeom>
-          <a:ln>
-            <a:solidFill>
-              <a:srgbClr val="C00000"/>
-            </a:solidFill>
-          </a:ln>
-        </p:spPr>
-        <p:style>
-          <a:lnRef idx="2">
-            <a:schemeClr val="accent1">
-              <a:shade val="50000"/>
-            </a:schemeClr>
-          </a:lnRef>
-          <a:fillRef idx="1">
-            <a:schemeClr val="accent1"/>
-          </a:fillRef>
-          <a:effectRef idx="0">
-            <a:schemeClr val="accent1"/>
-          </a:effectRef>
-          <a:fontRef idx="minor">
-            <a:schemeClr val="lt1"/>
-          </a:fontRef>
-        </p:style>
-        <p:txBody>
-          <a:bodyPr rtlCol="0" anchor="ctr"/>
-          <a:lstStyle/>
-          <a:p>
-            <a:pPr algn="ctr"/>
-            <a:r>
-              <a:rPr lang="es-ES" dirty="0" smtClean="0"/>
-              <a:t>TABLA CON LAS HISTORIAS DE USUARIO ORDENADAS</a:t>
-            </a:r>
-            <a:endParaRPr lang="es-ES" dirty="0"/>
-          </a:p>
-        </p:txBody>
-      </p:sp>
-      <p:sp>
-        <p:nvSpPr>
-          <p:cNvPr id="6" name="5 Rectángulo"/>
-          <p:cNvSpPr/>
-          <p:nvPr/>
-        </p:nvSpPr>
-        <p:spPr>
-          <a:xfrm>
-            <a:off x="5004048" y="2043336"/>
-            <a:ext cx="1800200" cy="360040"/>
-          </a:xfrm>
-          <a:prstGeom prst="rect">
-            <a:avLst/>
-          </a:prstGeom>
-        </p:spPr>
-        <p:style>
-          <a:lnRef idx="2">
-            <a:schemeClr val="accent6"/>
-          </a:lnRef>
-          <a:fillRef idx="1">
-            <a:schemeClr val="lt1"/>
-          </a:fillRef>
-          <a:effectRef idx="0">
-            <a:schemeClr val="accent6"/>
-          </a:effectRef>
-          <a:fontRef idx="minor">
-            <a:schemeClr val="dk1"/>
-          </a:fontRef>
-        </p:style>
-        <p:txBody>
-          <a:bodyPr rtlCol="0" anchor="ctr"/>
-          <a:lstStyle/>
-          <a:p>
-            <a:pPr algn="ctr"/>
-            <a:r>
-              <a:rPr lang="es-ES" dirty="0" smtClean="0"/>
-              <a:t>POR PRIORIDAD</a:t>
-            </a:r>
-            <a:endParaRPr lang="es-ES" dirty="0"/>
-          </a:p>
-        </p:txBody>
-      </p:sp>
-      <p:sp>
-        <p:nvSpPr>
-          <p:cNvPr id="7" name="6 Rectángulo"/>
-          <p:cNvSpPr/>
-          <p:nvPr/>
-        </p:nvSpPr>
-        <p:spPr>
-          <a:xfrm>
-            <a:off x="6804248" y="2043336"/>
-            <a:ext cx="1728192" cy="360040"/>
-          </a:xfrm>
-          <a:prstGeom prst="rect">
-            <a:avLst/>
-          </a:prstGeom>
-        </p:spPr>
-        <p:style>
-          <a:lnRef idx="2">
-            <a:schemeClr val="accent6"/>
-          </a:lnRef>
-          <a:fillRef idx="1">
-            <a:schemeClr val="lt1"/>
-          </a:fillRef>
-          <a:effectRef idx="0">
-            <a:schemeClr val="accent6"/>
-          </a:effectRef>
-          <a:fontRef idx="minor">
-            <a:schemeClr val="dk1"/>
-          </a:fontRef>
-        </p:style>
-        <p:txBody>
-          <a:bodyPr rtlCol="0" anchor="ctr"/>
-          <a:lstStyle/>
-          <a:p>
-            <a:pPr algn="ctr"/>
-            <a:r>
-              <a:rPr lang="es-ES" dirty="0" smtClean="0"/>
-              <a:t>POR ESFUERZO</a:t>
-            </a:r>
-            <a:endParaRPr lang="es-ES" dirty="0"/>
-          </a:p>
-        </p:txBody>
-      </p:sp>
-      <p:sp>
-        <p:nvSpPr>
-          <p:cNvPr id="8" name="7 Rectángulo"/>
-          <p:cNvSpPr/>
-          <p:nvPr/>
-        </p:nvSpPr>
-        <p:spPr>
-          <a:xfrm>
-            <a:off x="769648" y="2395100"/>
-            <a:ext cx="2592289" cy="288032"/>
-          </a:xfrm>
-          <a:prstGeom prst="rect">
-            <a:avLst/>
-          </a:prstGeom>
-          <a:solidFill>
-            <a:schemeClr val="accent3">
-              <a:lumMod val="60000"/>
-              <a:lumOff val="40000"/>
-            </a:schemeClr>
-          </a:solidFill>
-        </p:spPr>
-        <p:style>
-          <a:lnRef idx="2">
-            <a:schemeClr val="accent1">
-              <a:shade val="50000"/>
-            </a:schemeClr>
-          </a:lnRef>
-          <a:fillRef idx="1">
-            <a:schemeClr val="accent1"/>
-          </a:fillRef>
-          <a:effectRef idx="0">
-            <a:schemeClr val="accent1"/>
-          </a:effectRef>
-          <a:fontRef idx="minor">
-            <a:schemeClr val="lt1"/>
-          </a:fontRef>
-        </p:style>
-        <p:txBody>
-          <a:bodyPr rtlCol="0" anchor="ctr"/>
-          <a:lstStyle/>
-          <a:p>
-            <a:pPr algn="ctr"/>
-            <a:r>
-              <a:rPr lang="es-ES" dirty="0" smtClean="0">
-                <a:solidFill>
-                  <a:schemeClr val="tx1"/>
-                </a:solidFill>
-              </a:rPr>
-              <a:t>TITULO</a:t>
-            </a:r>
-            <a:endParaRPr lang="es-ES" dirty="0">
-              <a:solidFill>
-                <a:schemeClr val="tx1"/>
-              </a:solidFill>
-            </a:endParaRPr>
-          </a:p>
-        </p:txBody>
-      </p:sp>
-      <p:sp>
-        <p:nvSpPr>
-          <p:cNvPr id="11" name="10 Rectángulo"/>
-          <p:cNvSpPr/>
-          <p:nvPr/>
-        </p:nvSpPr>
-        <p:spPr>
-          <a:xfrm>
-            <a:off x="4462782" y="2395208"/>
-            <a:ext cx="1347704" cy="288032"/>
-          </a:xfrm>
-          <a:prstGeom prst="rect">
-            <a:avLst/>
-          </a:prstGeom>
-          <a:solidFill>
-            <a:schemeClr val="accent3">
-              <a:lumMod val="60000"/>
-              <a:lumOff val="40000"/>
-            </a:schemeClr>
-          </a:solidFill>
-        </p:spPr>
-        <p:style>
-          <a:lnRef idx="2">
-            <a:schemeClr val="accent1">
-              <a:shade val="50000"/>
-            </a:schemeClr>
-          </a:lnRef>
-          <a:fillRef idx="1">
-            <a:schemeClr val="accent1"/>
-          </a:fillRef>
-          <a:effectRef idx="0">
-            <a:schemeClr val="accent1"/>
-          </a:effectRef>
-          <a:fontRef idx="minor">
-            <a:schemeClr val="lt1"/>
-          </a:fontRef>
-        </p:style>
-        <p:txBody>
-          <a:bodyPr rtlCol="0" anchor="ctr"/>
-          <a:lstStyle/>
-          <a:p>
-            <a:pPr algn="ctr"/>
-            <a:r>
-              <a:rPr lang="es-ES" dirty="0" smtClean="0">
-                <a:solidFill>
-                  <a:schemeClr val="tx1"/>
-                </a:solidFill>
-              </a:rPr>
-              <a:t>PRIORIDAD</a:t>
-            </a:r>
-            <a:endParaRPr lang="es-ES" dirty="0">
-              <a:solidFill>
-                <a:schemeClr val="tx1"/>
-              </a:solidFill>
-            </a:endParaRPr>
-          </a:p>
-        </p:txBody>
-      </p:sp>
-      <p:sp>
-        <p:nvSpPr>
-          <p:cNvPr id="12" name="11 Rectángulo"/>
-          <p:cNvSpPr/>
-          <p:nvPr/>
-        </p:nvSpPr>
-        <p:spPr>
-          <a:xfrm>
-            <a:off x="5796135" y="2395208"/>
-            <a:ext cx="1197953" cy="288032"/>
-          </a:xfrm>
-          <a:prstGeom prst="rect">
-            <a:avLst/>
-          </a:prstGeom>
-          <a:solidFill>
-            <a:schemeClr val="accent3">
-              <a:lumMod val="60000"/>
-              <a:lumOff val="40000"/>
-            </a:schemeClr>
-          </a:solidFill>
-        </p:spPr>
-        <p:style>
-          <a:lnRef idx="2">
-            <a:schemeClr val="accent1">
-              <a:shade val="50000"/>
-            </a:schemeClr>
-          </a:lnRef>
-          <a:fillRef idx="1">
-            <a:schemeClr val="accent1"/>
-          </a:fillRef>
-          <a:effectRef idx="0">
-            <a:schemeClr val="accent1"/>
-          </a:effectRef>
-          <a:fontRef idx="minor">
-            <a:schemeClr val="lt1"/>
-          </a:fontRef>
-        </p:style>
-        <p:txBody>
-          <a:bodyPr rtlCol="0" anchor="ctr"/>
-          <a:lstStyle/>
-          <a:p>
-            <a:pPr algn="ctr"/>
-            <a:r>
-              <a:rPr lang="es-ES" dirty="0" smtClean="0">
-                <a:solidFill>
-                  <a:schemeClr val="tx1"/>
-                </a:solidFill>
-              </a:rPr>
-              <a:t>ESFUERZO</a:t>
-            </a:r>
-            <a:endParaRPr lang="es-ES" dirty="0">
-              <a:solidFill>
-                <a:schemeClr val="tx1"/>
-              </a:solidFill>
-            </a:endParaRPr>
-          </a:p>
-        </p:txBody>
-      </p:sp>
-      <p:sp>
-        <p:nvSpPr>
-          <p:cNvPr id="13" name="12 Rectángulo"/>
-          <p:cNvSpPr/>
-          <p:nvPr/>
-        </p:nvSpPr>
-        <p:spPr>
-          <a:xfrm>
-            <a:off x="769648" y="476672"/>
-            <a:ext cx="2146168" cy="288032"/>
-          </a:xfrm>
-          <a:prstGeom prst="rect">
-            <a:avLst/>
-          </a:prstGeom>
-          <a:solidFill>
-            <a:schemeClr val="accent3">
-              <a:lumMod val="60000"/>
-              <a:lumOff val="40000"/>
-            </a:schemeClr>
-          </a:solidFill>
-        </p:spPr>
-        <p:style>
-          <a:lnRef idx="2">
-            <a:schemeClr val="accent1">
-              <a:shade val="50000"/>
-            </a:schemeClr>
-          </a:lnRef>
-          <a:fillRef idx="1">
-            <a:schemeClr val="accent1"/>
-          </a:fillRef>
-          <a:effectRef idx="0">
-            <a:schemeClr val="accent1"/>
-          </a:effectRef>
-          <a:fontRef idx="minor">
-            <a:schemeClr val="lt1"/>
-          </a:fontRef>
-        </p:style>
-        <p:txBody>
-          <a:bodyPr rtlCol="0" anchor="ctr"/>
-          <a:lstStyle/>
-          <a:p>
-            <a:pPr algn="ctr"/>
-            <a:r>
-              <a:rPr lang="es-ES" dirty="0" smtClean="0">
-                <a:solidFill>
-                  <a:schemeClr val="tx1"/>
-                </a:solidFill>
-              </a:rPr>
-              <a:t>TITULO</a:t>
-            </a:r>
-            <a:endParaRPr lang="es-ES" dirty="0">
-              <a:solidFill>
-                <a:schemeClr val="tx1"/>
-              </a:solidFill>
-            </a:endParaRPr>
-          </a:p>
-        </p:txBody>
-      </p:sp>
-      <p:sp>
-        <p:nvSpPr>
-          <p:cNvPr id="14" name="13 Rectángulo"/>
-          <p:cNvSpPr/>
-          <p:nvPr/>
-        </p:nvSpPr>
-        <p:spPr>
-          <a:xfrm>
-            <a:off x="2915816" y="476672"/>
-            <a:ext cx="4104454" cy="288032"/>
-          </a:xfrm>
-          <a:prstGeom prst="rect">
-            <a:avLst/>
-          </a:prstGeom>
-          <a:solidFill>
-            <a:schemeClr val="accent3">
-              <a:lumMod val="60000"/>
-              <a:lumOff val="40000"/>
-            </a:schemeClr>
-          </a:solidFill>
-        </p:spPr>
-        <p:style>
-          <a:lnRef idx="2">
-            <a:schemeClr val="accent1">
-              <a:shade val="50000"/>
-            </a:schemeClr>
-          </a:lnRef>
-          <a:fillRef idx="1">
-            <a:schemeClr val="accent1"/>
-          </a:fillRef>
-          <a:effectRef idx="0">
-            <a:schemeClr val="accent1"/>
-          </a:effectRef>
-          <a:fontRef idx="minor">
-            <a:schemeClr val="lt1"/>
-          </a:fontRef>
-        </p:style>
-        <p:txBody>
-          <a:bodyPr rtlCol="0" anchor="ctr"/>
-          <a:lstStyle/>
-          <a:p>
-            <a:pPr algn="ctr"/>
-            <a:r>
-              <a:rPr lang="es-ES" dirty="0" smtClean="0">
-                <a:solidFill>
-                  <a:schemeClr val="tx1"/>
-                </a:solidFill>
-              </a:rPr>
-              <a:t>Descripción</a:t>
-            </a:r>
-            <a:endParaRPr lang="es-ES" dirty="0">
-              <a:solidFill>
-                <a:schemeClr val="tx1"/>
-              </a:solidFill>
-            </a:endParaRPr>
-          </a:p>
-        </p:txBody>
-      </p:sp>
-      <p:sp>
-        <p:nvSpPr>
-          <p:cNvPr id="16" name="15 Rectángulo"/>
-          <p:cNvSpPr/>
-          <p:nvPr/>
-        </p:nvSpPr>
-        <p:spPr>
-          <a:xfrm>
-            <a:off x="7020269" y="476672"/>
-            <a:ext cx="1512169" cy="288032"/>
-          </a:xfrm>
-          <a:prstGeom prst="rect">
-            <a:avLst/>
-          </a:prstGeom>
-          <a:solidFill>
-            <a:srgbClr val="FF0000"/>
-          </a:solidFill>
-        </p:spPr>
-        <p:style>
-          <a:lnRef idx="2">
-            <a:schemeClr val="accent1">
-              <a:shade val="50000"/>
-            </a:schemeClr>
-          </a:lnRef>
-          <a:fillRef idx="1">
-            <a:schemeClr val="accent1"/>
-          </a:fillRef>
-          <a:effectRef idx="0">
-            <a:schemeClr val="accent1"/>
-          </a:effectRef>
-          <a:fontRef idx="minor">
-            <a:schemeClr val="lt1"/>
-          </a:fontRef>
-        </p:style>
-        <p:txBody>
-          <a:bodyPr rtlCol="0" anchor="ctr"/>
-          <a:lstStyle/>
-          <a:p>
-            <a:pPr algn="ctr"/>
-            <a:r>
-              <a:rPr lang="es-ES" sz="1000" b="1" dirty="0" smtClean="0"/>
-              <a:t>BOTON  DE ASIGNAR</a:t>
-            </a:r>
-            <a:endParaRPr lang="es-ES" sz="1000" b="1" dirty="0"/>
-          </a:p>
-        </p:txBody>
-      </p:sp>
-      <p:sp>
-        <p:nvSpPr>
-          <p:cNvPr id="17" name="16 Rectángulo"/>
-          <p:cNvSpPr/>
-          <p:nvPr/>
-        </p:nvSpPr>
-        <p:spPr>
-          <a:xfrm>
-            <a:off x="7020270" y="2395208"/>
-            <a:ext cx="1512169" cy="288032"/>
-          </a:xfrm>
-          <a:prstGeom prst="rect">
-            <a:avLst/>
-          </a:prstGeom>
-          <a:solidFill>
-            <a:srgbClr val="FF0000"/>
-          </a:solidFill>
-        </p:spPr>
-        <p:style>
-          <a:lnRef idx="2">
-            <a:schemeClr val="accent1">
-              <a:shade val="50000"/>
-            </a:schemeClr>
-          </a:lnRef>
-          <a:fillRef idx="1">
-            <a:schemeClr val="accent1"/>
-          </a:fillRef>
-          <a:effectRef idx="0">
-            <a:schemeClr val="accent1"/>
-          </a:effectRef>
-          <a:fontRef idx="minor">
-            <a:schemeClr val="lt1"/>
-          </a:fontRef>
-        </p:style>
-        <p:txBody>
-          <a:bodyPr rtlCol="0" anchor="ctr"/>
-          <a:lstStyle/>
-          <a:p>
-            <a:pPr algn="ctr"/>
-            <a:r>
-              <a:rPr lang="es-ES" sz="1000" b="1" dirty="0" smtClean="0"/>
-              <a:t>BOTON  DE CONSULTAR</a:t>
-            </a:r>
-            <a:endParaRPr lang="es-ES" sz="1000" b="1" dirty="0"/>
-          </a:p>
-        </p:txBody>
-      </p:sp>
-      <p:sp>
-        <p:nvSpPr>
-          <p:cNvPr id="18" name="17 Rectángulo"/>
-          <p:cNvSpPr/>
-          <p:nvPr/>
-        </p:nvSpPr>
-        <p:spPr>
-          <a:xfrm>
-            <a:off x="3566713" y="2044475"/>
-            <a:ext cx="1431100" cy="360040"/>
-          </a:xfrm>
-          <a:prstGeom prst="rect">
-            <a:avLst/>
-          </a:prstGeom>
-        </p:spPr>
-        <p:style>
-          <a:lnRef idx="2">
-            <a:schemeClr val="accent6"/>
-          </a:lnRef>
-          <a:fillRef idx="1">
-            <a:schemeClr val="lt1"/>
-          </a:fillRef>
-          <a:effectRef idx="0">
-            <a:schemeClr val="accent6"/>
-          </a:effectRef>
-          <a:fontRef idx="minor">
-            <a:schemeClr val="dk1"/>
-          </a:fontRef>
-        </p:style>
-        <p:txBody>
-          <a:bodyPr rtlCol="0" anchor="ctr"/>
-          <a:lstStyle/>
-          <a:p>
-            <a:pPr algn="ctr"/>
-            <a:r>
-              <a:rPr lang="es-ES" dirty="0" smtClean="0"/>
-              <a:t>POR VALOR</a:t>
-            </a:r>
-            <a:endParaRPr lang="es-ES" dirty="0"/>
-          </a:p>
-        </p:txBody>
-      </p:sp>
-      <p:sp>
-        <p:nvSpPr>
-          <p:cNvPr id="19" name="18 Rectángulo"/>
-          <p:cNvSpPr/>
-          <p:nvPr/>
-        </p:nvSpPr>
-        <p:spPr>
-          <a:xfrm>
-            <a:off x="3347864" y="2395208"/>
-            <a:ext cx="1114918" cy="288032"/>
-          </a:xfrm>
-          <a:prstGeom prst="rect">
-            <a:avLst/>
-          </a:prstGeom>
-          <a:solidFill>
-            <a:schemeClr val="accent3">
-              <a:lumMod val="60000"/>
-              <a:lumOff val="40000"/>
-            </a:schemeClr>
-          </a:solidFill>
-        </p:spPr>
-        <p:style>
-          <a:lnRef idx="2">
-            <a:schemeClr val="accent1">
-              <a:shade val="50000"/>
-            </a:schemeClr>
-          </a:lnRef>
-          <a:fillRef idx="1">
-            <a:schemeClr val="accent1"/>
-          </a:fillRef>
-          <a:effectRef idx="0">
-            <a:schemeClr val="accent1"/>
-          </a:effectRef>
-          <a:fontRef idx="minor">
-            <a:schemeClr val="lt1"/>
-          </a:fontRef>
-        </p:style>
-        <p:txBody>
-          <a:bodyPr rtlCol="0" anchor="ctr"/>
-          <a:lstStyle/>
-          <a:p>
-            <a:pPr algn="ctr"/>
-            <a:r>
-              <a:rPr lang="es-ES" dirty="0" smtClean="0">
-                <a:solidFill>
-                  <a:schemeClr val="tx1"/>
-                </a:solidFill>
-              </a:rPr>
-              <a:t>VALOR</a:t>
-            </a:r>
-            <a:endParaRPr lang="es-ES" dirty="0">
-              <a:solidFill>
-                <a:schemeClr val="tx1"/>
-              </a:solidFill>
-            </a:endParaRPr>
-          </a:p>
-        </p:txBody>
-      </p:sp>
-      <p:sp>
-        <p:nvSpPr>
-          <p:cNvPr id="21" name="20 CuadroTexto"/>
-          <p:cNvSpPr txBox="1"/>
-          <p:nvPr/>
-        </p:nvSpPr>
-        <p:spPr>
-          <a:xfrm>
-            <a:off x="807028" y="188640"/>
-            <a:ext cx="7699762" cy="369332"/>
-          </a:xfrm>
-          <a:prstGeom prst="rect">
-            <a:avLst/>
-          </a:prstGeom>
-          <a:noFill/>
-        </p:spPr>
-        <p:txBody>
-          <a:bodyPr wrap="square" rtlCol="0">
-            <a:spAutoFit/>
-          </a:bodyPr>
-          <a:lstStyle/>
-          <a:p>
-            <a:r>
-              <a:rPr lang="es-ES" b="1" dirty="0" smtClean="0">
-                <a:solidFill>
-                  <a:srgbClr val="FF0000"/>
-                </a:solidFill>
-              </a:rPr>
-              <a:t>HISTORIAS DE USUARIO </a:t>
-            </a:r>
-            <a:r>
-              <a:rPr lang="es-ES" dirty="0" smtClean="0"/>
-              <a:t>(</a:t>
-            </a:r>
-            <a:r>
-              <a:rPr lang="es-ES" dirty="0" err="1" smtClean="0"/>
-              <a:t>mockup</a:t>
-            </a:r>
-            <a:r>
-              <a:rPr lang="es-ES" dirty="0" smtClean="0"/>
-              <a:t> INICIAL)</a:t>
-            </a:r>
-            <a:endParaRPr lang="es-ES" dirty="0"/>
-          </a:p>
-        </p:txBody>
-      </p:sp>
-    </p:spTree>
-    <p:extLst>
-      <p:ext uri="{BB962C8B-B14F-4D97-AF65-F5344CB8AC3E}">
-        <p14:creationId xmlns:p14="http://schemas.microsoft.com/office/powerpoint/2010/main" val="2634625473"/>
-      </p:ext>
-    </p:extLst>
-  </p:cSld>
-  <p:clrMapOvr>
-    <a:masterClrMapping/>
-  </p:clrMapOvr>
-  <p:timing>
-    <p:tnLst>
-      <p:par>
-        <p:cTn id="1" dur="indefinite" restart="never" nodeType="tmRoot"/>
-      </p:par>
-    </p:tnLst>
-  </p:timing>
-</p:sld>
-</file>
-
-<file path=ppt/slides/slide5.xml><?xml version="1.0" encoding="utf-8"?>
-<p:sld xmlns:a="http://schemas.openxmlformats.org/drawingml/2006/main" xmlns:r="http://schemas.openxmlformats.org/officeDocument/2006/relationships" xmlns:p="http://schemas.openxmlformats.org/presentationml/2006/main">
-  <p:cSld>
-    <p:spTree>
-      <p:nvGrpSpPr>
-        <p:cNvPr id="1" name=""/>
-        <p:cNvGrpSpPr/>
-        <p:nvPr/>
-      </p:nvGrpSpPr>
-      <p:grpSpPr>
-        <a:xfrm>
-          <a:off x="0" y="0"/>
-          <a:ext cx="0" cy="0"/>
-          <a:chOff x="0" y="0"/>
-          <a:chExt cx="0" cy="0"/>
-        </a:xfrm>
-      </p:grpSpPr>
-      <p:sp>
-        <p:nvSpPr>
-          <p:cNvPr id="4" name="3 Rectángulo"/>
-          <p:cNvSpPr/>
-          <p:nvPr/>
-        </p:nvSpPr>
-        <p:spPr>
-          <a:xfrm>
-            <a:off x="769648" y="496291"/>
-            <a:ext cx="7776864" cy="1368152"/>
-          </a:xfrm>
-          <a:prstGeom prst="rect">
-            <a:avLst/>
-          </a:prstGeom>
-        </p:spPr>
-        <p:style>
-          <a:lnRef idx="2">
-            <a:schemeClr val="accent1">
-              <a:shade val="50000"/>
-            </a:schemeClr>
-          </a:lnRef>
-          <a:fillRef idx="1">
-            <a:schemeClr val="accent1"/>
-          </a:fillRef>
-          <a:effectRef idx="0">
-            <a:schemeClr val="accent1"/>
-          </a:effectRef>
-          <a:fontRef idx="minor">
-            <a:schemeClr val="lt1"/>
-          </a:fontRef>
-        </p:style>
-        <p:txBody>
-          <a:bodyPr rtlCol="0" anchor="ctr"/>
-          <a:lstStyle/>
-          <a:p>
-            <a:pPr algn="ctr"/>
-            <a:r>
-              <a:rPr lang="es-ES" dirty="0" smtClean="0"/>
-              <a:t>HISTORIAS RECIEN CREADAS</a:t>
-            </a:r>
-            <a:endParaRPr lang="es-ES" dirty="0"/>
-          </a:p>
-        </p:txBody>
-      </p:sp>
-      <p:sp>
-        <p:nvSpPr>
-          <p:cNvPr id="5" name="4 Rectángulo"/>
-          <p:cNvSpPr/>
-          <p:nvPr/>
-        </p:nvSpPr>
-        <p:spPr>
-          <a:xfrm>
-            <a:off x="755576" y="2420888"/>
-            <a:ext cx="7776864" cy="3672408"/>
-          </a:xfrm>
-          <a:prstGeom prst="rect">
-            <a:avLst/>
-          </a:prstGeom>
-          <a:ln>
-            <a:solidFill>
-              <a:srgbClr val="C00000"/>
-            </a:solidFill>
-          </a:ln>
-        </p:spPr>
-        <p:style>
-          <a:lnRef idx="2">
-            <a:schemeClr val="accent1">
-              <a:shade val="50000"/>
-            </a:schemeClr>
-          </a:lnRef>
-          <a:fillRef idx="1">
-            <a:schemeClr val="accent1"/>
-          </a:fillRef>
-          <a:effectRef idx="0">
-            <a:schemeClr val="accent1"/>
-          </a:effectRef>
-          <a:fontRef idx="minor">
-            <a:schemeClr val="lt1"/>
-          </a:fontRef>
-        </p:style>
-        <p:txBody>
-          <a:bodyPr rtlCol="0" anchor="ctr"/>
-          <a:lstStyle/>
-          <a:p>
-            <a:pPr algn="ctr"/>
-            <a:r>
-              <a:rPr lang="es-ES" dirty="0" smtClean="0"/>
-              <a:t>TABLA CON LAS HISTORIAS DE USUARIO ORDENADAS</a:t>
-            </a:r>
-            <a:endParaRPr lang="es-ES" dirty="0"/>
-          </a:p>
-        </p:txBody>
-      </p:sp>
-      <p:sp>
-        <p:nvSpPr>
-          <p:cNvPr id="6" name="5 Rectángulo"/>
-          <p:cNvSpPr/>
-          <p:nvPr/>
-        </p:nvSpPr>
-        <p:spPr>
-          <a:xfrm>
-            <a:off x="5004048" y="2043336"/>
-            <a:ext cx="1800200" cy="360040"/>
-          </a:xfrm>
-          <a:prstGeom prst="rect">
-            <a:avLst/>
-          </a:prstGeom>
-        </p:spPr>
-        <p:style>
-          <a:lnRef idx="2">
-            <a:schemeClr val="accent6"/>
-          </a:lnRef>
-          <a:fillRef idx="1">
-            <a:schemeClr val="lt1"/>
-          </a:fillRef>
-          <a:effectRef idx="0">
-            <a:schemeClr val="accent6"/>
-          </a:effectRef>
-          <a:fontRef idx="minor">
-            <a:schemeClr val="dk1"/>
-          </a:fontRef>
-        </p:style>
-        <p:txBody>
-          <a:bodyPr rtlCol="0" anchor="ctr"/>
-          <a:lstStyle/>
-          <a:p>
-            <a:pPr algn="ctr"/>
-            <a:r>
-              <a:rPr lang="es-ES" dirty="0" smtClean="0"/>
-              <a:t>POR PRIORIDAD</a:t>
-            </a:r>
-            <a:endParaRPr lang="es-ES" dirty="0"/>
-          </a:p>
-        </p:txBody>
-      </p:sp>
-      <p:sp>
-        <p:nvSpPr>
-          <p:cNvPr id="7" name="6 Rectángulo"/>
-          <p:cNvSpPr/>
-          <p:nvPr/>
-        </p:nvSpPr>
-        <p:spPr>
-          <a:xfrm>
-            <a:off x="6804248" y="2043336"/>
-            <a:ext cx="1728192" cy="360040"/>
-          </a:xfrm>
-          <a:prstGeom prst="rect">
-            <a:avLst/>
-          </a:prstGeom>
-        </p:spPr>
-        <p:style>
-          <a:lnRef idx="2">
-            <a:schemeClr val="accent6"/>
-          </a:lnRef>
-          <a:fillRef idx="1">
-            <a:schemeClr val="lt1"/>
-          </a:fillRef>
-          <a:effectRef idx="0">
-            <a:schemeClr val="accent6"/>
-          </a:effectRef>
-          <a:fontRef idx="minor">
-            <a:schemeClr val="dk1"/>
-          </a:fontRef>
-        </p:style>
-        <p:txBody>
-          <a:bodyPr rtlCol="0" anchor="ctr"/>
-          <a:lstStyle/>
-          <a:p>
-            <a:pPr algn="ctr"/>
-            <a:r>
-              <a:rPr lang="es-ES" dirty="0" smtClean="0"/>
-              <a:t>POR ESFUERZO</a:t>
-            </a:r>
-            <a:endParaRPr lang="es-ES" dirty="0"/>
-          </a:p>
-        </p:txBody>
-      </p:sp>
-      <p:sp>
-        <p:nvSpPr>
-          <p:cNvPr id="8" name="7 Rectángulo"/>
-          <p:cNvSpPr/>
-          <p:nvPr/>
-        </p:nvSpPr>
-        <p:spPr>
-          <a:xfrm>
-            <a:off x="769648" y="2395100"/>
-            <a:ext cx="2592289" cy="288032"/>
-          </a:xfrm>
-          <a:prstGeom prst="rect">
-            <a:avLst/>
-          </a:prstGeom>
-          <a:solidFill>
-            <a:schemeClr val="accent3">
-              <a:lumMod val="60000"/>
-              <a:lumOff val="40000"/>
-            </a:schemeClr>
-          </a:solidFill>
-        </p:spPr>
-        <p:style>
-          <a:lnRef idx="2">
-            <a:schemeClr val="accent1">
-              <a:shade val="50000"/>
-            </a:schemeClr>
-          </a:lnRef>
-          <a:fillRef idx="1">
-            <a:schemeClr val="accent1"/>
-          </a:fillRef>
-          <a:effectRef idx="0">
-            <a:schemeClr val="accent1"/>
-          </a:effectRef>
-          <a:fontRef idx="minor">
-            <a:schemeClr val="lt1"/>
-          </a:fontRef>
-        </p:style>
-        <p:txBody>
-          <a:bodyPr rtlCol="0" anchor="ctr"/>
-          <a:lstStyle/>
-          <a:p>
-            <a:pPr algn="ctr"/>
-            <a:r>
-              <a:rPr lang="es-ES" dirty="0" smtClean="0">
-                <a:solidFill>
-                  <a:schemeClr val="tx1"/>
-                </a:solidFill>
-              </a:rPr>
-              <a:t>TITULO</a:t>
-            </a:r>
-            <a:endParaRPr lang="es-ES" dirty="0">
-              <a:solidFill>
-                <a:schemeClr val="tx1"/>
-              </a:solidFill>
-            </a:endParaRPr>
-          </a:p>
-        </p:txBody>
-      </p:sp>
-      <p:sp>
-        <p:nvSpPr>
-          <p:cNvPr id="11" name="10 Rectángulo"/>
-          <p:cNvSpPr/>
-          <p:nvPr/>
-        </p:nvSpPr>
-        <p:spPr>
-          <a:xfrm>
-            <a:off x="4462782" y="2395208"/>
-            <a:ext cx="1347704" cy="288032"/>
-          </a:xfrm>
-          <a:prstGeom prst="rect">
-            <a:avLst/>
-          </a:prstGeom>
-          <a:solidFill>
-            <a:schemeClr val="accent3">
-              <a:lumMod val="60000"/>
-              <a:lumOff val="40000"/>
-            </a:schemeClr>
-          </a:solidFill>
-        </p:spPr>
-        <p:style>
-          <a:lnRef idx="2">
-            <a:schemeClr val="accent1">
-              <a:shade val="50000"/>
-            </a:schemeClr>
-          </a:lnRef>
-          <a:fillRef idx="1">
-            <a:schemeClr val="accent1"/>
-          </a:fillRef>
-          <a:effectRef idx="0">
-            <a:schemeClr val="accent1"/>
-          </a:effectRef>
-          <a:fontRef idx="minor">
-            <a:schemeClr val="lt1"/>
-          </a:fontRef>
-        </p:style>
-        <p:txBody>
-          <a:bodyPr rtlCol="0" anchor="ctr"/>
-          <a:lstStyle/>
-          <a:p>
-            <a:pPr algn="ctr"/>
-            <a:r>
-              <a:rPr lang="es-ES" dirty="0" smtClean="0">
-                <a:solidFill>
-                  <a:schemeClr val="tx1"/>
-                </a:solidFill>
-              </a:rPr>
-              <a:t>PRIORIDAD</a:t>
-            </a:r>
-            <a:endParaRPr lang="es-ES" dirty="0">
-              <a:solidFill>
-                <a:schemeClr val="tx1"/>
-              </a:solidFill>
-            </a:endParaRPr>
-          </a:p>
-        </p:txBody>
-      </p:sp>
-      <p:sp>
-        <p:nvSpPr>
-          <p:cNvPr id="12" name="11 Rectángulo"/>
-          <p:cNvSpPr/>
-          <p:nvPr/>
-        </p:nvSpPr>
-        <p:spPr>
-          <a:xfrm>
-            <a:off x="5796135" y="2395208"/>
-            <a:ext cx="1197953" cy="288032"/>
-          </a:xfrm>
-          <a:prstGeom prst="rect">
-            <a:avLst/>
-          </a:prstGeom>
-          <a:solidFill>
-            <a:schemeClr val="accent3">
-              <a:lumMod val="60000"/>
-              <a:lumOff val="40000"/>
-            </a:schemeClr>
-          </a:solidFill>
-        </p:spPr>
-        <p:style>
-          <a:lnRef idx="2">
-            <a:schemeClr val="accent1">
-              <a:shade val="50000"/>
-            </a:schemeClr>
-          </a:lnRef>
-          <a:fillRef idx="1">
-            <a:schemeClr val="accent1"/>
-          </a:fillRef>
-          <a:effectRef idx="0">
-            <a:schemeClr val="accent1"/>
-          </a:effectRef>
-          <a:fontRef idx="minor">
-            <a:schemeClr val="lt1"/>
-          </a:fontRef>
-        </p:style>
-        <p:txBody>
-          <a:bodyPr rtlCol="0" anchor="ctr"/>
-          <a:lstStyle/>
-          <a:p>
-            <a:pPr algn="ctr"/>
-            <a:r>
-              <a:rPr lang="es-ES" dirty="0" smtClean="0">
-                <a:solidFill>
-                  <a:schemeClr val="tx1"/>
-                </a:solidFill>
-              </a:rPr>
-              <a:t>ESFUERZO</a:t>
-            </a:r>
-            <a:endParaRPr lang="es-ES" dirty="0">
-              <a:solidFill>
-                <a:schemeClr val="tx1"/>
-              </a:solidFill>
-            </a:endParaRPr>
-          </a:p>
-        </p:txBody>
-      </p:sp>
-      <p:sp>
-        <p:nvSpPr>
-          <p:cNvPr id="13" name="12 Rectángulo"/>
-          <p:cNvSpPr/>
-          <p:nvPr/>
-        </p:nvSpPr>
-        <p:spPr>
-          <a:xfrm>
-            <a:off x="769648" y="476672"/>
-            <a:ext cx="2146168" cy="288032"/>
-          </a:xfrm>
-          <a:prstGeom prst="rect">
-            <a:avLst/>
-          </a:prstGeom>
-          <a:solidFill>
-            <a:schemeClr val="accent3">
-              <a:lumMod val="60000"/>
-              <a:lumOff val="40000"/>
-            </a:schemeClr>
-          </a:solidFill>
-        </p:spPr>
-        <p:style>
-          <a:lnRef idx="2">
-            <a:schemeClr val="accent1">
-              <a:shade val="50000"/>
-            </a:schemeClr>
-          </a:lnRef>
-          <a:fillRef idx="1">
-            <a:schemeClr val="accent1"/>
-          </a:fillRef>
-          <a:effectRef idx="0">
-            <a:schemeClr val="accent1"/>
-          </a:effectRef>
-          <a:fontRef idx="minor">
-            <a:schemeClr val="lt1"/>
-          </a:fontRef>
-        </p:style>
-        <p:txBody>
-          <a:bodyPr rtlCol="0" anchor="ctr"/>
-          <a:lstStyle/>
-          <a:p>
-            <a:pPr algn="ctr"/>
-            <a:r>
-              <a:rPr lang="es-ES" dirty="0" smtClean="0">
-                <a:solidFill>
-                  <a:schemeClr val="tx1"/>
-                </a:solidFill>
-              </a:rPr>
-              <a:t>TITULO</a:t>
-            </a:r>
-            <a:endParaRPr lang="es-ES" dirty="0">
-              <a:solidFill>
-                <a:schemeClr val="tx1"/>
-              </a:solidFill>
-            </a:endParaRPr>
-          </a:p>
-        </p:txBody>
-      </p:sp>
-      <p:sp>
-        <p:nvSpPr>
-          <p:cNvPr id="14" name="13 Rectángulo"/>
-          <p:cNvSpPr/>
-          <p:nvPr/>
-        </p:nvSpPr>
-        <p:spPr>
-          <a:xfrm>
-            <a:off x="2915816" y="476672"/>
-            <a:ext cx="4104454" cy="288032"/>
-          </a:xfrm>
-          <a:prstGeom prst="rect">
-            <a:avLst/>
-          </a:prstGeom>
-          <a:solidFill>
-            <a:schemeClr val="accent3">
-              <a:lumMod val="60000"/>
-              <a:lumOff val="40000"/>
-            </a:schemeClr>
-          </a:solidFill>
-        </p:spPr>
-        <p:style>
-          <a:lnRef idx="2">
-            <a:schemeClr val="accent1">
-              <a:shade val="50000"/>
-            </a:schemeClr>
-          </a:lnRef>
-          <a:fillRef idx="1">
-            <a:schemeClr val="accent1"/>
-          </a:fillRef>
-          <a:effectRef idx="0">
-            <a:schemeClr val="accent1"/>
-          </a:effectRef>
-          <a:fontRef idx="minor">
-            <a:schemeClr val="lt1"/>
-          </a:fontRef>
-        </p:style>
-        <p:txBody>
-          <a:bodyPr rtlCol="0" anchor="ctr"/>
-          <a:lstStyle/>
-          <a:p>
-            <a:pPr algn="ctr"/>
-            <a:r>
-              <a:rPr lang="es-ES" dirty="0" smtClean="0">
-                <a:solidFill>
-                  <a:schemeClr val="tx1"/>
-                </a:solidFill>
-              </a:rPr>
-              <a:t>Descripción</a:t>
-            </a:r>
-            <a:endParaRPr lang="es-ES" dirty="0">
-              <a:solidFill>
-                <a:schemeClr val="tx1"/>
-              </a:solidFill>
-            </a:endParaRPr>
-          </a:p>
-        </p:txBody>
-      </p:sp>
-      <p:sp>
-        <p:nvSpPr>
-          <p:cNvPr id="16" name="15 Rectángulo"/>
-          <p:cNvSpPr/>
-          <p:nvPr/>
-        </p:nvSpPr>
-        <p:spPr>
-          <a:xfrm>
-            <a:off x="7020269" y="476672"/>
-            <a:ext cx="1512169" cy="288032"/>
-          </a:xfrm>
-          <a:prstGeom prst="rect">
-            <a:avLst/>
-          </a:prstGeom>
-          <a:solidFill>
-            <a:srgbClr val="FF0000"/>
-          </a:solidFill>
-        </p:spPr>
-        <p:style>
-          <a:lnRef idx="2">
-            <a:schemeClr val="accent1">
-              <a:shade val="50000"/>
-            </a:schemeClr>
-          </a:lnRef>
-          <a:fillRef idx="1">
-            <a:schemeClr val="accent1"/>
-          </a:fillRef>
-          <a:effectRef idx="0">
-            <a:schemeClr val="accent1"/>
-          </a:effectRef>
-          <a:fontRef idx="minor">
-            <a:schemeClr val="lt1"/>
-          </a:fontRef>
-        </p:style>
-        <p:txBody>
-          <a:bodyPr rtlCol="0" anchor="ctr"/>
-          <a:lstStyle/>
-          <a:p>
-            <a:pPr algn="ctr"/>
-            <a:r>
-              <a:rPr lang="es-ES" sz="1000" b="1" dirty="0" smtClean="0"/>
-              <a:t>BOTON  DE ASIGNAR</a:t>
-            </a:r>
-            <a:endParaRPr lang="es-ES" sz="1000" b="1" dirty="0"/>
-          </a:p>
-        </p:txBody>
-      </p:sp>
-      <p:sp>
-        <p:nvSpPr>
-          <p:cNvPr id="17" name="16 Rectángulo"/>
-          <p:cNvSpPr/>
-          <p:nvPr/>
-        </p:nvSpPr>
-        <p:spPr>
-          <a:xfrm>
-            <a:off x="7020270" y="2395208"/>
-            <a:ext cx="1512169" cy="288032"/>
-          </a:xfrm>
-          <a:prstGeom prst="rect">
-            <a:avLst/>
-          </a:prstGeom>
-          <a:solidFill>
-            <a:srgbClr val="FF0000"/>
-          </a:solidFill>
-        </p:spPr>
-        <p:style>
-          <a:lnRef idx="2">
-            <a:schemeClr val="accent1">
-              <a:shade val="50000"/>
-            </a:schemeClr>
-          </a:lnRef>
-          <a:fillRef idx="1">
-            <a:schemeClr val="accent1"/>
-          </a:fillRef>
-          <a:effectRef idx="0">
-            <a:schemeClr val="accent1"/>
-          </a:effectRef>
-          <a:fontRef idx="minor">
-            <a:schemeClr val="lt1"/>
-          </a:fontRef>
-        </p:style>
-        <p:txBody>
-          <a:bodyPr rtlCol="0" anchor="ctr"/>
-          <a:lstStyle/>
-          <a:p>
-            <a:pPr algn="ctr"/>
-            <a:r>
-              <a:rPr lang="es-ES" sz="1000" b="1" dirty="0" smtClean="0"/>
-              <a:t>BOTON  DE CONSULTAR</a:t>
-            </a:r>
-            <a:endParaRPr lang="es-ES" sz="1000" b="1" dirty="0"/>
-          </a:p>
-        </p:txBody>
-      </p:sp>
-      <p:sp>
-        <p:nvSpPr>
-          <p:cNvPr id="18" name="17 Rectángulo"/>
-          <p:cNvSpPr/>
-          <p:nvPr/>
-        </p:nvSpPr>
-        <p:spPr>
-          <a:xfrm>
-            <a:off x="3566713" y="2044475"/>
-            <a:ext cx="1431100" cy="360040"/>
-          </a:xfrm>
-          <a:prstGeom prst="rect">
-            <a:avLst/>
-          </a:prstGeom>
-        </p:spPr>
-        <p:style>
-          <a:lnRef idx="2">
-            <a:schemeClr val="accent6"/>
-          </a:lnRef>
-          <a:fillRef idx="1">
-            <a:schemeClr val="lt1"/>
-          </a:fillRef>
-          <a:effectRef idx="0">
-            <a:schemeClr val="accent6"/>
-          </a:effectRef>
-          <a:fontRef idx="minor">
-            <a:schemeClr val="dk1"/>
-          </a:fontRef>
-        </p:style>
-        <p:txBody>
-          <a:bodyPr rtlCol="0" anchor="ctr"/>
-          <a:lstStyle/>
-          <a:p>
-            <a:pPr algn="ctr"/>
-            <a:r>
-              <a:rPr lang="es-ES" dirty="0" smtClean="0"/>
-              <a:t>POR VALOR</a:t>
-            </a:r>
-            <a:endParaRPr lang="es-ES" dirty="0"/>
-          </a:p>
-        </p:txBody>
-      </p:sp>
-      <p:sp>
-        <p:nvSpPr>
-          <p:cNvPr id="19" name="18 Rectángulo"/>
-          <p:cNvSpPr/>
-          <p:nvPr/>
-        </p:nvSpPr>
-        <p:spPr>
-          <a:xfrm>
-            <a:off x="3347864" y="2395208"/>
-            <a:ext cx="1114918" cy="288032"/>
-          </a:xfrm>
-          <a:prstGeom prst="rect">
-            <a:avLst/>
-          </a:prstGeom>
-          <a:solidFill>
-            <a:schemeClr val="accent3">
-              <a:lumMod val="60000"/>
-              <a:lumOff val="40000"/>
-            </a:schemeClr>
-          </a:solidFill>
-        </p:spPr>
-        <p:style>
-          <a:lnRef idx="2">
-            <a:schemeClr val="accent1">
-              <a:shade val="50000"/>
-            </a:schemeClr>
-          </a:lnRef>
-          <a:fillRef idx="1">
-            <a:schemeClr val="accent1"/>
-          </a:fillRef>
-          <a:effectRef idx="0">
-            <a:schemeClr val="accent1"/>
-          </a:effectRef>
-          <a:fontRef idx="minor">
-            <a:schemeClr val="lt1"/>
-          </a:fontRef>
-        </p:style>
-        <p:txBody>
-          <a:bodyPr rtlCol="0" anchor="ctr"/>
-          <a:lstStyle/>
-          <a:p>
-            <a:pPr algn="ctr"/>
-            <a:r>
-              <a:rPr lang="es-ES" dirty="0" smtClean="0">
-                <a:solidFill>
-                  <a:schemeClr val="tx1"/>
-                </a:solidFill>
-              </a:rPr>
-              <a:t>VALOR</a:t>
-            </a:r>
-            <a:endParaRPr lang="es-ES" dirty="0">
-              <a:solidFill>
-                <a:schemeClr val="tx1"/>
-              </a:solidFill>
-            </a:endParaRPr>
-          </a:p>
-        </p:txBody>
-      </p:sp>
-      <p:sp>
-        <p:nvSpPr>
-          <p:cNvPr id="15" name="14 CuadroTexto"/>
-          <p:cNvSpPr txBox="1"/>
-          <p:nvPr/>
-        </p:nvSpPr>
-        <p:spPr>
-          <a:xfrm>
-            <a:off x="807028" y="188640"/>
-            <a:ext cx="7699762" cy="369332"/>
-          </a:xfrm>
-          <a:prstGeom prst="rect">
-            <a:avLst/>
-          </a:prstGeom>
-          <a:noFill/>
-        </p:spPr>
-        <p:txBody>
-          <a:bodyPr wrap="square" rtlCol="0">
-            <a:spAutoFit/>
-          </a:bodyPr>
-          <a:lstStyle/>
-          <a:p>
-            <a:r>
-              <a:rPr lang="es-ES" b="1" dirty="0" smtClean="0">
-                <a:solidFill>
-                  <a:srgbClr val="FF0000"/>
-                </a:solidFill>
-              </a:rPr>
-              <a:t>HISTORIAS DE USUARIO </a:t>
-            </a:r>
-            <a:r>
-              <a:rPr lang="es-ES" dirty="0" smtClean="0"/>
-              <a:t>(</a:t>
-            </a:r>
-            <a:r>
-              <a:rPr lang="es-ES" dirty="0" err="1" smtClean="0"/>
-              <a:t>mockup</a:t>
-            </a:r>
-            <a:r>
-              <a:rPr lang="es-ES" dirty="0" smtClean="0"/>
-              <a:t> OTRAS VERSIONES)</a:t>
-            </a:r>
-            <a:endParaRPr lang="es-ES" dirty="0"/>
-          </a:p>
-        </p:txBody>
-      </p:sp>
-    </p:spTree>
-    <p:extLst>
-      <p:ext uri="{BB962C8B-B14F-4D97-AF65-F5344CB8AC3E}">
-        <p14:creationId xmlns:p14="http://schemas.microsoft.com/office/powerpoint/2010/main" val="359576819"/>
       </p:ext>
     </p:extLst>
   </p:cSld>

</xml_diff>